<commit_message>
Update 2022.10.27 group meeting slides and README
</commit_message>
<xml_diff>
--- a/CS338-GroupB.pptx
+++ b/CS338-GroupB.pptx
@@ -11,6 +11,7 @@
     <p:sldId id="262" r:id="rId5"/>
     <p:sldId id="263" r:id="rId6"/>
     <p:sldId id="264" r:id="rId7"/>
+    <p:sldId id="265" r:id="rId8"/>
   </p:sldIdLst>
   <p:sldSz cx="12192000" cy="6858000"/>
   <p:notesSz cx="6858000" cy="9144000"/>
@@ -275,7 +276,7 @@
           <a:p>
             <a:fld id="{1ACFD723-6F9E-4CA8-9C47-BAEF2119BA8D}" type="datetimeFigureOut">
               <a:rPr lang="zh-CN" altLang="en-US" smtClean="0"/>
-              <a:t>2022/10/21</a:t>
+              <a:t>2022/10/27</a:t>
             </a:fld>
             <a:endParaRPr lang="zh-CN" altLang="en-US"/>
           </a:p>
@@ -473,7 +474,7 @@
           <a:p>
             <a:fld id="{1ACFD723-6F9E-4CA8-9C47-BAEF2119BA8D}" type="datetimeFigureOut">
               <a:rPr lang="zh-CN" altLang="en-US" smtClean="0"/>
-              <a:t>2022/10/21</a:t>
+              <a:t>2022/10/27</a:t>
             </a:fld>
             <a:endParaRPr lang="zh-CN" altLang="en-US"/>
           </a:p>
@@ -681,7 +682,7 @@
           <a:p>
             <a:fld id="{1ACFD723-6F9E-4CA8-9C47-BAEF2119BA8D}" type="datetimeFigureOut">
               <a:rPr lang="zh-CN" altLang="en-US" smtClean="0"/>
-              <a:t>2022/10/21</a:t>
+              <a:t>2022/10/27</a:t>
             </a:fld>
             <a:endParaRPr lang="zh-CN" altLang="en-US"/>
           </a:p>
@@ -879,7 +880,7 @@
           <a:p>
             <a:fld id="{1ACFD723-6F9E-4CA8-9C47-BAEF2119BA8D}" type="datetimeFigureOut">
               <a:rPr lang="zh-CN" altLang="en-US" smtClean="0"/>
-              <a:t>2022/10/21</a:t>
+              <a:t>2022/10/27</a:t>
             </a:fld>
             <a:endParaRPr lang="zh-CN" altLang="en-US"/>
           </a:p>
@@ -1154,7 +1155,7 @@
           <a:p>
             <a:fld id="{1ACFD723-6F9E-4CA8-9C47-BAEF2119BA8D}" type="datetimeFigureOut">
               <a:rPr lang="zh-CN" altLang="en-US" smtClean="0"/>
-              <a:t>2022/10/21</a:t>
+              <a:t>2022/10/27</a:t>
             </a:fld>
             <a:endParaRPr lang="zh-CN" altLang="en-US"/>
           </a:p>
@@ -1419,7 +1420,7 @@
           <a:p>
             <a:fld id="{1ACFD723-6F9E-4CA8-9C47-BAEF2119BA8D}" type="datetimeFigureOut">
               <a:rPr lang="zh-CN" altLang="en-US" smtClean="0"/>
-              <a:t>2022/10/21</a:t>
+              <a:t>2022/10/27</a:t>
             </a:fld>
             <a:endParaRPr lang="zh-CN" altLang="en-US"/>
           </a:p>
@@ -1831,7 +1832,7 @@
           <a:p>
             <a:fld id="{1ACFD723-6F9E-4CA8-9C47-BAEF2119BA8D}" type="datetimeFigureOut">
               <a:rPr lang="zh-CN" altLang="en-US" smtClean="0"/>
-              <a:t>2022/10/21</a:t>
+              <a:t>2022/10/27</a:t>
             </a:fld>
             <a:endParaRPr lang="zh-CN" altLang="en-US"/>
           </a:p>
@@ -1972,7 +1973,7 @@
           <a:p>
             <a:fld id="{1ACFD723-6F9E-4CA8-9C47-BAEF2119BA8D}" type="datetimeFigureOut">
               <a:rPr lang="zh-CN" altLang="en-US" smtClean="0"/>
-              <a:t>2022/10/21</a:t>
+              <a:t>2022/10/27</a:t>
             </a:fld>
             <a:endParaRPr lang="zh-CN" altLang="en-US"/>
           </a:p>
@@ -2085,7 +2086,7 @@
           <a:p>
             <a:fld id="{1ACFD723-6F9E-4CA8-9C47-BAEF2119BA8D}" type="datetimeFigureOut">
               <a:rPr lang="zh-CN" altLang="en-US" smtClean="0"/>
-              <a:t>2022/10/21</a:t>
+              <a:t>2022/10/27</a:t>
             </a:fld>
             <a:endParaRPr lang="zh-CN" altLang="en-US"/>
           </a:p>
@@ -2396,7 +2397,7 @@
           <a:p>
             <a:fld id="{1ACFD723-6F9E-4CA8-9C47-BAEF2119BA8D}" type="datetimeFigureOut">
               <a:rPr lang="zh-CN" altLang="en-US" smtClean="0"/>
-              <a:t>2022/10/21</a:t>
+              <a:t>2022/10/27</a:t>
             </a:fld>
             <a:endParaRPr lang="zh-CN" altLang="en-US"/>
           </a:p>
@@ -2684,7 +2685,7 @@
           <a:p>
             <a:fld id="{1ACFD723-6F9E-4CA8-9C47-BAEF2119BA8D}" type="datetimeFigureOut">
               <a:rPr lang="zh-CN" altLang="en-US" smtClean="0"/>
-              <a:t>2022/10/21</a:t>
+              <a:t>2022/10/27</a:t>
             </a:fld>
             <a:endParaRPr lang="zh-CN" altLang="en-US"/>
           </a:p>
@@ -2925,7 +2926,7 @@
           <a:p>
             <a:fld id="{1ACFD723-6F9E-4CA8-9C47-BAEF2119BA8D}" type="datetimeFigureOut">
               <a:rPr lang="zh-CN" altLang="en-US" smtClean="0"/>
-              <a:t>2022/10/21</a:t>
+              <a:t>2022/10/27</a:t>
             </a:fld>
             <a:endParaRPr lang="zh-CN" altLang="en-US"/>
           </a:p>
@@ -5232,6 +5233,174 @@
 </p:sld>
 </file>
 
+<file path=ppt/slides/slide7.xml><?xml version="1.0" encoding="utf-8"?>
+<p:sld xmlns:a="http://schemas.openxmlformats.org/drawingml/2006/main" xmlns:r="http://schemas.openxmlformats.org/officeDocument/2006/relationships" xmlns:p="http://schemas.openxmlformats.org/presentationml/2006/main">
+  <p:cSld>
+    <p:spTree>
+      <p:nvGrpSpPr>
+        <p:cNvPr id="1" name=""/>
+        <p:cNvGrpSpPr/>
+        <p:nvPr/>
+      </p:nvGrpSpPr>
+      <p:grpSpPr>
+        <a:xfrm>
+          <a:off x="0" y="0"/>
+          <a:ext cx="0" cy="0"/>
+          <a:chOff x="0" y="0"/>
+          <a:chExt cx="0" cy="0"/>
+        </a:xfrm>
+      </p:grpSpPr>
+      <p:sp>
+        <p:nvSpPr>
+          <p:cNvPr id="2" name="标题 1">
+            <a:extLst>
+              <a:ext uri="{FF2B5EF4-FFF2-40B4-BE49-F238E27FC236}">
+                <a16:creationId xmlns:a16="http://schemas.microsoft.com/office/drawing/2014/main" id="{DF8D27CC-7649-40A4-AE4F-EB8B01AB3008}"/>
+              </a:ext>
+            </a:extLst>
+          </p:cNvPr>
+          <p:cNvSpPr>
+            <a:spLocks noGrp="1"/>
+          </p:cNvSpPr>
+          <p:nvPr>
+            <p:ph type="title"/>
+          </p:nvPr>
+        </p:nvSpPr>
+        <p:spPr/>
+        <p:txBody>
+          <a:bodyPr/>
+          <a:lstStyle/>
+          <a:p>
+            <a:r>
+              <a:rPr lang="en-US" altLang="zh-CN" dirty="0"/>
+              <a:t>Plan 10.27–11.3</a:t>
+            </a:r>
+            <a:endParaRPr lang="zh-CN" altLang="en-US" dirty="0"/>
+          </a:p>
+        </p:txBody>
+      </p:sp>
+      <p:sp>
+        <p:nvSpPr>
+          <p:cNvPr id="3" name="内容占位符 2">
+            <a:extLst>
+              <a:ext uri="{FF2B5EF4-FFF2-40B4-BE49-F238E27FC236}">
+                <a16:creationId xmlns:a16="http://schemas.microsoft.com/office/drawing/2014/main" id="{16729093-59D5-495A-B2A7-B6CFD6D7E419}"/>
+              </a:ext>
+            </a:extLst>
+          </p:cNvPr>
+          <p:cNvSpPr>
+            <a:spLocks noGrp="1"/>
+          </p:cNvSpPr>
+          <p:nvPr>
+            <p:ph idx="1"/>
+          </p:nvPr>
+        </p:nvSpPr>
+        <p:spPr/>
+        <p:txBody>
+          <a:bodyPr/>
+          <a:lstStyle/>
+          <a:p>
+            <a:r>
+              <a:rPr lang="zh-CN" altLang="en-US" dirty="0"/>
+              <a:t>超凡，沐孜：继续处理数据</a:t>
+            </a:r>
+            <a:endParaRPr lang="en-US" altLang="zh-CN" dirty="0"/>
+          </a:p>
+          <a:p>
+            <a:pPr lvl="1"/>
+            <a:r>
+              <a:rPr lang="en-US" altLang="zh-CN" dirty="0"/>
+              <a:t>demo.py</a:t>
+            </a:r>
+          </a:p>
+          <a:p>
+            <a:pPr lvl="2"/>
+            <a:r>
+              <a:rPr lang="en-US" altLang="zh-CN" dirty="0" err="1"/>
+              <a:t>Smpl</a:t>
+            </a:r>
+            <a:r>
+              <a:rPr lang="en-US" altLang="zh-CN" dirty="0"/>
+              <a:t> to 3d joints to 3D </a:t>
+            </a:r>
+            <a:r>
+              <a:rPr lang="en-US" altLang="zh-CN" dirty="0" err="1"/>
+              <a:t>keypoints</a:t>
+            </a:r>
+            <a:endParaRPr lang="en-US" altLang="zh-CN" dirty="0"/>
+          </a:p>
+          <a:p>
+            <a:pPr lvl="2"/>
+            <a:r>
+              <a:rPr lang="en-US" altLang="zh-CN" dirty="0"/>
+              <a:t>3D </a:t>
+            </a:r>
+            <a:r>
+              <a:rPr lang="en-US" altLang="zh-CN" dirty="0" err="1"/>
+              <a:t>keypoints</a:t>
+            </a:r>
+            <a:r>
+              <a:rPr lang="en-US" altLang="zh-CN" dirty="0"/>
+              <a:t> to 2D </a:t>
+            </a:r>
+            <a:r>
+              <a:rPr lang="en-US" altLang="zh-CN" dirty="0" err="1"/>
+              <a:t>keypoints</a:t>
+            </a:r>
+            <a:endParaRPr lang="en-US" altLang="zh-CN" dirty="0"/>
+          </a:p>
+          <a:p>
+            <a:pPr lvl="2"/>
+            <a:r>
+              <a:rPr lang="en-US" altLang="zh-CN" dirty="0"/>
+              <a:t>Metric</a:t>
+            </a:r>
+          </a:p>
+          <a:p>
+            <a:pPr lvl="3"/>
+            <a:r>
+              <a:rPr lang="en-US" altLang="zh-CN"/>
+              <a:t>PA-MPJPE</a:t>
+            </a:r>
+            <a:endParaRPr lang="en-US" altLang="zh-CN" dirty="0"/>
+          </a:p>
+          <a:p>
+            <a:pPr lvl="3"/>
+            <a:endParaRPr lang="en-US" altLang="zh-CN" dirty="0"/>
+          </a:p>
+          <a:p>
+            <a:r>
+              <a:rPr lang="zh-CN" altLang="en-US" dirty="0"/>
+              <a:t>天元：数据接口实现</a:t>
+            </a:r>
+            <a:endParaRPr lang="en-US" altLang="zh-CN" dirty="0"/>
+          </a:p>
+          <a:p>
+            <a:r>
+              <a:rPr lang="zh-CN" altLang="en-US" dirty="0"/>
+              <a:t>含冲：</a:t>
+            </a:r>
+            <a:r>
+              <a:rPr lang="en-US" altLang="zh-CN" dirty="0"/>
+              <a:t>diffusion</a:t>
+            </a:r>
+            <a:endParaRPr lang="zh-CN" altLang="en-US" dirty="0"/>
+          </a:p>
+        </p:txBody>
+      </p:sp>
+    </p:spTree>
+    <p:extLst>
+      <p:ext uri="{BB962C8B-B14F-4D97-AF65-F5344CB8AC3E}">
+        <p14:creationId xmlns:p14="http://schemas.microsoft.com/office/powerpoint/2010/main" val="3149484062"/>
+      </p:ext>
+    </p:extLst>
+  </p:cSld>
+  <p:clrMapOvr>
+    <a:masterClrMapping/>
+  </p:clrMapOvr>
+</p:sld>
+</file>
+
 <file path=ppt/theme/theme1.xml><?xml version="1.0" encoding="utf-8"?>
 <a:theme xmlns:a="http://schemas.openxmlformats.org/drawingml/2006/main" name="Office 主题​​">
   <a:themeElements>

</xml_diff>